<commit_message>
Modifications before Humanis Training
</commit_message>
<xml_diff>
--- a/exo-sysAdmin/920-Config-XSys-en.pptx
+++ b/exo-sysAdmin/920-Config-XSys-en.pptx
@@ -21503,11 +21503,7 @@
             </a:pPr>
             <a:r>
               <a:rPr lang="fr-FR" dirty="0" smtClean="0"/>
-              <a:t>Configure eXo </a:t>
-            </a:r>
-            <a:r>
-              <a:rPr lang="fr-FR" dirty="0" smtClean="0"/>
-              <a:t>to </a:t>
+              <a:t>Configure eXo to </a:t>
             </a:r>
             <a:r>
               <a:rPr lang="fr-FR" dirty="0" err="1" smtClean="0"/>
@@ -21850,43 +21846,43 @@
             <a:pPr marL="219361" indent="-216749">
               <a:buNone/>
             </a:pPr>
-            <a:endParaRPr lang="en-US" dirty="0"/>
+            <a:endParaRPr lang="en-US" sz="3200" dirty="0"/>
           </a:p>
           <a:p>
             <a:pPr marL="584962" lvl="1" indent="-219361"/>
             <a:r>
-              <a:rPr lang="en-US" dirty="0" smtClean="0"/>
+              <a:rPr lang="en-US" sz="2800" dirty="0" smtClean="0"/>
               <a:t>Configuration Properties</a:t>
             </a:r>
           </a:p>
           <a:p>
             <a:pPr marL="584962" lvl="1" indent="-219361"/>
             <a:r>
-              <a:rPr lang="en-US" dirty="0" smtClean="0"/>
+              <a:rPr lang="en-US" sz="2800" dirty="0" smtClean="0"/>
               <a:t>Database Configuration</a:t>
             </a:r>
           </a:p>
           <a:p>
             <a:pPr marL="584962" lvl="1" indent="-219361"/>
             <a:r>
-              <a:rPr lang="en-US" dirty="0" smtClean="0"/>
+              <a:rPr lang="en-US" sz="2800" dirty="0" smtClean="0"/>
               <a:t>Mail Server Configuration</a:t>
             </a:r>
           </a:p>
           <a:p>
             <a:pPr marL="584962" lvl="1" indent="-219361"/>
             <a:r>
-              <a:rPr lang="en-US" dirty="0" smtClean="0"/>
+              <a:rPr lang="en-US" sz="2800" dirty="0" smtClean="0"/>
               <a:t>Logging</a:t>
             </a:r>
           </a:p>
           <a:p>
             <a:pPr marL="584962" lvl="1" indent="-219361"/>
             <a:r>
-              <a:rPr lang="en-US" dirty="0" smtClean="0"/>
+              <a:rPr lang="en-US" sz="2800" dirty="0" smtClean="0"/>
               <a:t>Exercise</a:t>
             </a:r>
-            <a:endParaRPr lang="en-US" dirty="0"/>
+            <a:endParaRPr lang="en-US" sz="2800" dirty="0"/>
           </a:p>
         </p:txBody>
       </p:sp>
@@ -22992,20 +22988,21 @@
           <a:bodyPr rIns="41783"/>
           <a:lstStyle/>
           <a:p>
-            <a:pPr marL="584962" lvl="1" indent="-219361">
+            <a:pPr marL="365601" lvl="1" indent="0">
               <a:lnSpc>
                 <a:spcPct val="100000"/>
               </a:lnSpc>
+              <a:buNone/>
             </a:pPr>
             <a:r>
-              <a:rPr lang="fr-FR" dirty="0" smtClean="0"/>
+              <a:rPr lang="fr-FR" sz="2800" dirty="0" smtClean="0"/>
               <a:t>MySQL </a:t>
             </a:r>
             <a:r>
-              <a:rPr lang="fr-FR" dirty="0" err="1" smtClean="0"/>
+              <a:rPr lang="fr-FR" sz="2800" dirty="0" err="1" smtClean="0"/>
               <a:t>example</a:t>
             </a:r>
-            <a:endParaRPr lang="fr-FR" dirty="0"/>
+            <a:endParaRPr lang="fr-FR" sz="2800" dirty="0"/>
           </a:p>
           <a:p>
             <a:pPr marL="584962" lvl="1" indent="-219361">
@@ -23243,7 +23240,7 @@
             <a:pPr eaLnBrk="1" hangingPunct="1"/>
             <a:r>
               <a:rPr lang="en-US" dirty="0" smtClean="0"/>
-              <a:t>Modify </a:t>
+              <a:t>Database - Modify </a:t>
             </a:r>
             <a:r>
               <a:rPr lang="en-US" dirty="0" err="1" smtClean="0"/>
@@ -23538,11 +23535,11 @@
             <a:pPr eaLnBrk="1" hangingPunct="1"/>
             <a:r>
               <a:rPr lang="en-US" dirty="0" smtClean="0"/>
-              <a:t>Add the </a:t>
+              <a:t>Database - Add </a:t>
             </a:r>
             <a:r>
               <a:rPr lang="en-US" dirty="0" smtClean="0"/>
-              <a:t>connector jar</a:t>
+              <a:t>the connector jar</a:t>
             </a:r>
           </a:p>
         </p:txBody>

</xml_diff>